<commit_message>
Added background img && update style
</commit_message>
<xml_diff>
--- a/Jobs.pptx
+++ b/Jobs.pptx
@@ -104,6 +104,11 @@
       </a:defRPr>
     </a:lvl9pPr>
   </p:defaultTextStyle>
+  <p:extLst>
+    <p:ext uri="{EFAFB233-063F-42B5-8137-9DF3F51BA10A}">
+      <p15:sldGuideLst xmlns:p15="http://schemas.microsoft.com/office/powerpoint/2012/main"/>
+    </p:ext>
+  </p:extLst>
 </p:presentation>
 </file>
 
@@ -256,7 +261,7 @@
           <a:p>
             <a:fld id="{D0A9A6E1-6EEB-4807-865F-AD2E81DC87C6}" type="datetimeFigureOut">
               <a:rPr lang="he-IL" smtClean="0"/>
-              <a:t>ט"ו/תמוז/תש"ף</a:t>
+              <a:t>י"ח/תמוז/תש"ף</a:t>
             </a:fld>
             <a:endParaRPr lang="he-IL"/>
           </a:p>
@@ -456,7 +461,7 @@
           <a:p>
             <a:fld id="{D0A9A6E1-6EEB-4807-865F-AD2E81DC87C6}" type="datetimeFigureOut">
               <a:rPr lang="he-IL" smtClean="0"/>
-              <a:t>ט"ו/תמוז/תש"ף</a:t>
+              <a:t>י"ח/תמוז/תש"ף</a:t>
             </a:fld>
             <a:endParaRPr lang="he-IL"/>
           </a:p>
@@ -666,7 +671,7 @@
           <a:p>
             <a:fld id="{D0A9A6E1-6EEB-4807-865F-AD2E81DC87C6}" type="datetimeFigureOut">
               <a:rPr lang="he-IL" smtClean="0"/>
-              <a:t>ט"ו/תמוז/תש"ף</a:t>
+              <a:t>י"ח/תמוז/תש"ף</a:t>
             </a:fld>
             <a:endParaRPr lang="he-IL"/>
           </a:p>
@@ -866,7 +871,7 @@
           <a:p>
             <a:fld id="{D0A9A6E1-6EEB-4807-865F-AD2E81DC87C6}" type="datetimeFigureOut">
               <a:rPr lang="he-IL" smtClean="0"/>
-              <a:t>ט"ו/תמוז/תש"ף</a:t>
+              <a:t>י"ח/תמוז/תש"ף</a:t>
             </a:fld>
             <a:endParaRPr lang="he-IL"/>
           </a:p>
@@ -1142,7 +1147,7 @@
           <a:p>
             <a:fld id="{D0A9A6E1-6EEB-4807-865F-AD2E81DC87C6}" type="datetimeFigureOut">
               <a:rPr lang="he-IL" smtClean="0"/>
-              <a:t>ט"ו/תמוז/תש"ף</a:t>
+              <a:t>י"ח/תמוז/תש"ף</a:t>
             </a:fld>
             <a:endParaRPr lang="he-IL"/>
           </a:p>
@@ -1410,7 +1415,7 @@
           <a:p>
             <a:fld id="{D0A9A6E1-6EEB-4807-865F-AD2E81DC87C6}" type="datetimeFigureOut">
               <a:rPr lang="he-IL" smtClean="0"/>
-              <a:t>ט"ו/תמוז/תש"ף</a:t>
+              <a:t>י"ח/תמוז/תש"ף</a:t>
             </a:fld>
             <a:endParaRPr lang="he-IL"/>
           </a:p>
@@ -1825,7 +1830,7 @@
           <a:p>
             <a:fld id="{D0A9A6E1-6EEB-4807-865F-AD2E81DC87C6}" type="datetimeFigureOut">
               <a:rPr lang="he-IL" smtClean="0"/>
-              <a:t>ט"ו/תמוז/תש"ף</a:t>
+              <a:t>י"ח/תמוז/תש"ף</a:t>
             </a:fld>
             <a:endParaRPr lang="he-IL"/>
           </a:p>
@@ -1967,7 +1972,7 @@
           <a:p>
             <a:fld id="{D0A9A6E1-6EEB-4807-865F-AD2E81DC87C6}" type="datetimeFigureOut">
               <a:rPr lang="he-IL" smtClean="0"/>
-              <a:t>ט"ו/תמוז/תש"ף</a:t>
+              <a:t>י"ח/תמוז/תש"ף</a:t>
             </a:fld>
             <a:endParaRPr lang="he-IL"/>
           </a:p>
@@ -2080,7 +2085,7 @@
           <a:p>
             <a:fld id="{D0A9A6E1-6EEB-4807-865F-AD2E81DC87C6}" type="datetimeFigureOut">
               <a:rPr lang="he-IL" smtClean="0"/>
-              <a:t>ט"ו/תמוז/תש"ף</a:t>
+              <a:t>י"ח/תמוז/תש"ף</a:t>
             </a:fld>
             <a:endParaRPr lang="he-IL"/>
           </a:p>
@@ -2393,7 +2398,7 @@
           <a:p>
             <a:fld id="{D0A9A6E1-6EEB-4807-865F-AD2E81DC87C6}" type="datetimeFigureOut">
               <a:rPr lang="he-IL" smtClean="0"/>
-              <a:t>ט"ו/תמוז/תש"ף</a:t>
+              <a:t>י"ח/תמוז/תש"ף</a:t>
             </a:fld>
             <a:endParaRPr lang="he-IL"/>
           </a:p>
@@ -2682,7 +2687,7 @@
           <a:p>
             <a:fld id="{D0A9A6E1-6EEB-4807-865F-AD2E81DC87C6}" type="datetimeFigureOut">
               <a:rPr lang="he-IL" smtClean="0"/>
-              <a:t>ט"ו/תמוז/תש"ף</a:t>
+              <a:t>י"ח/תמוז/תש"ף</a:t>
             </a:fld>
             <a:endParaRPr lang="he-IL"/>
           </a:p>
@@ -2925,7 +2930,7 @@
           <a:p>
             <a:fld id="{D0A9A6E1-6EEB-4807-865F-AD2E81DC87C6}" type="datetimeFigureOut">
               <a:rPr lang="he-IL" smtClean="0"/>
-              <a:t>ט"ו/תמוז/תש"ף</a:t>
+              <a:t>י"ח/תמוז/תש"ף</a:t>
             </a:fld>
             <a:endParaRPr lang="he-IL"/>
           </a:p>
@@ -3328,6 +3333,14 @@
 <file path=ppt/slides/slide1.xml><?xml version="1.0" encoding="utf-8"?>
 <p:sld xmlns:a="http://schemas.openxmlformats.org/drawingml/2006/main" xmlns:r="http://schemas.openxmlformats.org/officeDocument/2006/relationships" xmlns:p="http://schemas.openxmlformats.org/presentationml/2006/main">
   <p:cSld>
+    <p:bg>
+      <p:bgPr>
+        <a:solidFill>
+          <a:srgbClr val="C8BFE7"/>
+        </a:solidFill>
+        <a:effectLst/>
+      </p:bgPr>
+    </p:bg>
     <p:spTree>
       <p:nvGrpSpPr>
         <p:cNvPr id="1" name=""/>
@@ -3342,48 +3355,147 @@
           <a:chExt cx="0" cy="0"/>
         </a:xfrm>
       </p:grpSpPr>
-      <p:sp>
-        <p:nvSpPr>
-          <p:cNvPr id="2" name="Title 1">
-            <a:extLst>
-              <a:ext uri="{FF2B5EF4-FFF2-40B4-BE49-F238E27FC236}">
-                <a16:creationId xmlns:a16="http://schemas.microsoft.com/office/drawing/2014/main" id="{9EFE9B6B-BF81-4EA4-8423-010B55D7DCCA}"/>
-              </a:ext>
-            </a:extLst>
-          </p:cNvPr>
-          <p:cNvSpPr>
-            <a:spLocks noGrp="1"/>
-          </p:cNvSpPr>
-          <p:nvPr>
-            <p:ph type="ctrTitle"/>
-          </p:nvPr>
-        </p:nvSpPr>
-        <p:spPr/>
-        <p:txBody>
-          <a:bodyPr>
-            <a:normAutofit/>
-          </a:bodyPr>
-          <a:lstStyle/>
-          <a:p>
-            <a:r>
-              <a:rPr lang="en-US" sz="9600" b="1" dirty="0">
-                <a:solidFill>
-                  <a:srgbClr val="0066FF"/>
-                </a:solidFill>
-                <a:latin typeface="MV Boli" panose="02000500030200090000" pitchFamily="2" charset="0"/>
-                <a:cs typeface="MV Boli" panose="02000500030200090000" pitchFamily="2" charset="0"/>
-              </a:rPr>
-              <a:t>&lt;Jobs&gt;</a:t>
-            </a:r>
-            <a:endParaRPr lang="he-IL" sz="9600" b="1" dirty="0">
-              <a:solidFill>
-                <a:srgbClr val="0066FF"/>
-              </a:solidFill>
-              <a:latin typeface="MV Boli" panose="02000500030200090000" pitchFamily="2" charset="0"/>
-            </a:endParaRPr>
-          </a:p>
-        </p:txBody>
-      </p:sp>
+      <p:grpSp>
+        <p:nvGrpSpPr>
+          <p:cNvPr id="3" name="Group 2">
+            <a:extLst>
+              <a:ext uri="{FF2B5EF4-FFF2-40B4-BE49-F238E27FC236}">
+                <a16:creationId xmlns:a16="http://schemas.microsoft.com/office/drawing/2014/main" id="{10CB1111-DAA0-4439-90BF-4B9284F3CF4E}"/>
+              </a:ext>
+            </a:extLst>
+          </p:cNvPr>
+          <p:cNvGrpSpPr/>
+          <p:nvPr/>
+        </p:nvGrpSpPr>
+        <p:grpSpPr>
+          <a:xfrm>
+            <a:off x="3284377" y="1698754"/>
+            <a:ext cx="5789544" cy="2237927"/>
+            <a:chOff x="3284377" y="1698754"/>
+            <a:chExt cx="5789544" cy="2237927"/>
+          </a:xfrm>
+        </p:grpSpPr>
+        <p:sp>
+          <p:nvSpPr>
+            <p:cNvPr id="5" name="Rectangle 4">
+              <a:extLst>
+                <a:ext uri="{FF2B5EF4-FFF2-40B4-BE49-F238E27FC236}">
+                  <a16:creationId xmlns:a16="http://schemas.microsoft.com/office/drawing/2014/main" id="{31D41461-679D-4A7D-B710-649B1C749EEB}"/>
+                </a:ext>
+              </a:extLst>
+            </p:cNvPr>
+            <p:cNvSpPr/>
+            <p:nvPr/>
+          </p:nvSpPr>
+          <p:spPr>
+            <a:xfrm>
+              <a:off x="3284377" y="1720690"/>
+              <a:ext cx="5789544" cy="2215991"/>
+            </a:xfrm>
+            <a:prstGeom prst="rect">
+              <a:avLst/>
+            </a:prstGeom>
+            <a:noFill/>
+          </p:spPr>
+          <p:txBody>
+            <a:bodyPr wrap="square" lIns="91440" tIns="45720" rIns="91440" bIns="45720" anchor="t" anchorCtr="0">
+              <a:spAutoFit/>
+            </a:bodyPr>
+            <a:lstStyle/>
+            <a:p>
+              <a:pPr algn="ctr"/>
+              <a:r>
+                <a:rPr lang="en-US" sz="13800" dirty="0">
+                  <a:ln w="0"/>
+                  <a:gradFill>
+                    <a:gsLst>
+                      <a:gs pos="0">
+                        <a:srgbClr val="C00000"/>
+                      </a:gs>
+                      <a:gs pos="50000">
+                        <a:srgbClr val="E74949"/>
+                      </a:gs>
+                      <a:gs pos="100000">
+                        <a:schemeClr val="accent5">
+                          <a:lumMod val="60000"/>
+                          <a:lumOff val="40000"/>
+                        </a:schemeClr>
+                      </a:gs>
+                    </a:gsLst>
+                    <a:lin ang="5400000"/>
+                  </a:gradFill>
+                  <a:effectLst>
+                    <a:reflection blurRad="6350" stA="53000" endA="300" endPos="35500" dir="5400000" sy="-90000" algn="bl" rotWithShape="0"/>
+                  </a:effectLst>
+                  <a:latin typeface="Comic Sans MS" panose="030F0702030302020204" pitchFamily="66" charset="0"/>
+                  <a:cs typeface="MV Boli" panose="02000500030200090000" pitchFamily="2" charset="0"/>
+                </a:rPr>
+                <a:t>&lt;Jobs&gt;</a:t>
+              </a:r>
+              <a:endParaRPr lang="he-IL" sz="13800" dirty="0">
+                <a:ln w="0"/>
+                <a:gradFill>
+                  <a:gsLst>
+                    <a:gs pos="0">
+                      <a:srgbClr val="C00000"/>
+                    </a:gs>
+                    <a:gs pos="50000">
+                      <a:srgbClr val="E74949"/>
+                    </a:gs>
+                    <a:gs pos="100000">
+                      <a:schemeClr val="accent5">
+                        <a:lumMod val="60000"/>
+                        <a:lumOff val="40000"/>
+                      </a:schemeClr>
+                    </a:gs>
+                  </a:gsLst>
+                  <a:lin ang="5400000"/>
+                </a:gradFill>
+                <a:effectLst>
+                  <a:reflection blurRad="6350" stA="53000" endA="300" endPos="35500" dir="5400000" sy="-90000" algn="bl" rotWithShape="0"/>
+                </a:effectLst>
+                <a:latin typeface="Comic Sans MS" panose="030F0702030302020204" pitchFamily="66" charset="0"/>
+              </a:endParaRPr>
+            </a:p>
+          </p:txBody>
+        </p:sp>
+        <p:pic>
+          <p:nvPicPr>
+            <p:cNvPr id="4" name="Picture 3">
+              <a:extLst>
+                <a:ext uri="{FF2B5EF4-FFF2-40B4-BE49-F238E27FC236}">
+                  <a16:creationId xmlns:a16="http://schemas.microsoft.com/office/drawing/2014/main" id="{088AFA7B-B11E-4B27-B6B7-9E30F1BEA795}"/>
+                </a:ext>
+              </a:extLst>
+            </p:cNvPr>
+            <p:cNvPicPr>
+              <a:picLocks noChangeAspect="1"/>
+            </p:cNvPicPr>
+            <p:nvPr/>
+          </p:nvPicPr>
+          <p:blipFill>
+            <a:blip r:embed="rId2">
+              <a:extLst>
+                <a:ext uri="{28A0092B-C50C-407E-A947-70E740481C1C}">
+                  <a14:useLocalDpi xmlns:a14="http://schemas.microsoft.com/office/drawing/2010/main" val="0"/>
+                </a:ext>
+              </a:extLst>
+            </a:blip>
+            <a:stretch>
+              <a:fillRect/>
+            </a:stretch>
+          </p:blipFill>
+          <p:spPr>
+            <a:xfrm rot="17144295">
+              <a:off x="5142834" y="1673893"/>
+              <a:ext cx="2109952" cy="2159673"/>
+            </a:xfrm>
+            <a:prstGeom prst="rect">
+              <a:avLst/>
+            </a:prstGeom>
+          </p:spPr>
+        </p:pic>
+      </p:grpSp>
     </p:spTree>
     <p:extLst>
       <p:ext uri="{BB962C8B-B14F-4D97-AF65-F5344CB8AC3E}">

</xml_diff>